<commit_message>
Documentation: Upadated AWS IoT QuickStart Instructions
</commit_message>
<xml_diff>
--- a/.assets/IoT-QuickStart-with-AWS.pptx
+++ b/.assets/IoT-QuickStart-with-AWS.pptx
@@ -5,28 +5,29 @@
     <p:sldMasterId id="2147483852" r:id="rId1"/>
   </p:sldMasterIdLst>
   <p:notesMasterIdLst>
-    <p:notesMasterId r:id="rId18"/>
+    <p:notesMasterId r:id="rId19"/>
   </p:notesMasterIdLst>
   <p:handoutMasterIdLst>
-    <p:handoutMasterId r:id="rId19"/>
+    <p:handoutMasterId r:id="rId20"/>
   </p:handoutMasterIdLst>
   <p:sldIdLst>
     <p:sldId id="256" r:id="rId2"/>
-    <p:sldId id="258" r:id="rId3"/>
-    <p:sldId id="261" r:id="rId4"/>
-    <p:sldId id="273" r:id="rId5"/>
-    <p:sldId id="259" r:id="rId6"/>
-    <p:sldId id="270" r:id="rId7"/>
-    <p:sldId id="266" r:id="rId8"/>
-    <p:sldId id="271" r:id="rId9"/>
-    <p:sldId id="272" r:id="rId10"/>
+    <p:sldId id="261" r:id="rId3"/>
+    <p:sldId id="273" r:id="rId4"/>
+    <p:sldId id="259" r:id="rId5"/>
+    <p:sldId id="270" r:id="rId6"/>
+    <p:sldId id="266" r:id="rId7"/>
+    <p:sldId id="276" r:id="rId8"/>
+    <p:sldId id="272" r:id="rId9"/>
+    <p:sldId id="271" r:id="rId10"/>
     <p:sldId id="269" r:id="rId11"/>
-    <p:sldId id="267" r:id="rId12"/>
-    <p:sldId id="262" r:id="rId13"/>
-    <p:sldId id="275" r:id="rId14"/>
-    <p:sldId id="263" r:id="rId15"/>
-    <p:sldId id="274" r:id="rId16"/>
-    <p:sldId id="265" r:id="rId17"/>
+    <p:sldId id="277" r:id="rId12"/>
+    <p:sldId id="267" r:id="rId13"/>
+    <p:sldId id="262" r:id="rId14"/>
+    <p:sldId id="275" r:id="rId15"/>
+    <p:sldId id="263" r:id="rId16"/>
+    <p:sldId id="274" r:id="rId17"/>
+    <p:sldId id="265" r:id="rId18"/>
   </p:sldIdLst>
   <p:sldSz cx="9144000" cy="6858000" type="screen4x3"/>
   <p:notesSz cx="6858000" cy="9144000"/>
@@ -211,7 +212,7 @@
             <a:fld id="{814910AB-AEF0-414C-82CB-791080B1186B}" type="datetimeFigureOut">
               <a:rPr lang="en-US" smtClean="0"/>
               <a:pPr/>
-              <a:t>6/21/2017</a:t>
+              <a:t>8/23/2017</a:t>
             </a:fld>
             <a:endParaRPr lang="en-US" dirty="0"/>
           </a:p>
@@ -378,7 +379,7 @@
             <a:fld id="{5B4AE38D-E020-46F3-803D-8636C5B7B74E}" type="datetimeFigureOut">
               <a:rPr lang="en-US" smtClean="0"/>
               <a:pPr/>
-              <a:t>6/21/2017</a:t>
+              <a:t>8/23/2017</a:t>
             </a:fld>
             <a:endParaRPr lang="en-US" dirty="0"/>
           </a:p>
@@ -760,7 +761,7 @@
             <a:fld id="{74DE7DC8-A302-4EFB-9208-987A80C71CE4}" type="slidenum">
               <a:rPr lang="en-US" smtClean="0"/>
               <a:pPr/>
-              <a:t>12</a:t>
+              <a:t>13</a:t>
             </a:fld>
             <a:endParaRPr lang="en-US" dirty="0"/>
           </a:p>
@@ -885,7 +886,7 @@
             <a:fld id="{74DE7DC8-A302-4EFB-9208-987A80C71CE4}" type="slidenum">
               <a:rPr lang="en-US" smtClean="0"/>
               <a:pPr/>
-              <a:t>13</a:t>
+              <a:t>14</a:t>
             </a:fld>
             <a:endParaRPr lang="en-US" dirty="0"/>
           </a:p>
@@ -1081,7 +1082,7 @@
             <a:fld id="{7DDB771E-4AED-4DD3-8AA1-5D9FD2224F14}" type="datetimeFigureOut">
               <a:rPr lang="en-US" smtClean="0"/>
               <a:pPr/>
-              <a:t>6/21/2017</a:t>
+              <a:t>8/23/2017</a:t>
             </a:fld>
             <a:endParaRPr lang="en-US" dirty="0"/>
           </a:p>
@@ -1248,7 +1249,7 @@
             <a:fld id="{7DDB771E-4AED-4DD3-8AA1-5D9FD2224F14}" type="datetimeFigureOut">
               <a:rPr lang="en-US" smtClean="0"/>
               <a:pPr/>
-              <a:t>6/21/2017</a:t>
+              <a:t>8/23/2017</a:t>
             </a:fld>
             <a:endParaRPr lang="en-US" dirty="0"/>
           </a:p>
@@ -1425,7 +1426,7 @@
             <a:fld id="{7DDB771E-4AED-4DD3-8AA1-5D9FD2224F14}" type="datetimeFigureOut">
               <a:rPr lang="en-US" smtClean="0"/>
               <a:pPr/>
-              <a:t>6/21/2017</a:t>
+              <a:t>8/23/2017</a:t>
             </a:fld>
             <a:endParaRPr lang="en-US" dirty="0"/>
           </a:p>
@@ -1592,7 +1593,7 @@
             <a:fld id="{7DDB771E-4AED-4DD3-8AA1-5D9FD2224F14}" type="datetimeFigureOut">
               <a:rPr lang="en-US" smtClean="0"/>
               <a:pPr/>
-              <a:t>6/21/2017</a:t>
+              <a:t>8/23/2017</a:t>
             </a:fld>
             <a:endParaRPr lang="en-US" dirty="0"/>
           </a:p>
@@ -1835,7 +1836,7 @@
             <a:fld id="{7DDB771E-4AED-4DD3-8AA1-5D9FD2224F14}" type="datetimeFigureOut">
               <a:rPr lang="en-US" smtClean="0"/>
               <a:pPr/>
-              <a:t>6/21/2017</a:t>
+              <a:t>8/23/2017</a:t>
             </a:fld>
             <a:endParaRPr lang="en-US" dirty="0"/>
           </a:p>
@@ -2120,7 +2121,7 @@
             <a:fld id="{7DDB771E-4AED-4DD3-8AA1-5D9FD2224F14}" type="datetimeFigureOut">
               <a:rPr lang="en-US" smtClean="0"/>
               <a:pPr/>
-              <a:t>6/21/2017</a:t>
+              <a:t>8/23/2017</a:t>
             </a:fld>
             <a:endParaRPr lang="en-US" dirty="0"/>
           </a:p>
@@ -2539,7 +2540,7 @@
             <a:fld id="{7DDB771E-4AED-4DD3-8AA1-5D9FD2224F14}" type="datetimeFigureOut">
               <a:rPr lang="en-US" smtClean="0"/>
               <a:pPr/>
-              <a:t>6/21/2017</a:t>
+              <a:t>8/23/2017</a:t>
             </a:fld>
             <a:endParaRPr lang="en-US" dirty="0"/>
           </a:p>
@@ -2654,7 +2655,7 @@
             <a:fld id="{7DDB771E-4AED-4DD3-8AA1-5D9FD2224F14}" type="datetimeFigureOut">
               <a:rPr lang="en-US" smtClean="0"/>
               <a:pPr/>
-              <a:t>6/21/2017</a:t>
+              <a:t>8/23/2017</a:t>
             </a:fld>
             <a:endParaRPr lang="en-US" dirty="0"/>
           </a:p>
@@ -2708,6 +2709,13 @@
   <p:clrMapOvr>
     <a:masterClrMapping/>
   </p:clrMapOvr>
+  <p:timing>
+    <p:tnLst>
+      <p:par>
+        <p:cTn id="1" dur="indefinite" restart="never" nodeType="tmRoot"/>
+      </p:par>
+    </p:tnLst>
+  </p:timing>
 </p:sldLayout>
 </file>
 
@@ -2746,7 +2754,7 @@
             <a:fld id="{7DDB771E-4AED-4DD3-8AA1-5D9FD2224F14}" type="datetimeFigureOut">
               <a:rPr lang="en-US" smtClean="0"/>
               <a:pPr/>
-              <a:t>6/21/2017</a:t>
+              <a:t>8/23/2017</a:t>
             </a:fld>
             <a:endParaRPr lang="en-US" dirty="0"/>
           </a:p>
@@ -3020,7 +3028,7 @@
             <a:fld id="{7DDB771E-4AED-4DD3-8AA1-5D9FD2224F14}" type="datetimeFigureOut">
               <a:rPr lang="en-US" smtClean="0"/>
               <a:pPr/>
-              <a:t>6/21/2017</a:t>
+              <a:t>8/23/2017</a:t>
             </a:fld>
             <a:endParaRPr lang="en-US" dirty="0"/>
           </a:p>
@@ -3270,7 +3278,7 @@
             <a:fld id="{7DDB771E-4AED-4DD3-8AA1-5D9FD2224F14}" type="datetimeFigureOut">
               <a:rPr lang="en-US" smtClean="0"/>
               <a:pPr/>
-              <a:t>6/21/2017</a:t>
+              <a:t>8/23/2017</a:t>
             </a:fld>
             <a:endParaRPr lang="en-US" dirty="0"/>
           </a:p>
@@ -3480,7 +3488,7 @@
             <a:fld id="{7DDB771E-4AED-4DD3-8AA1-5D9FD2224F14}" type="datetimeFigureOut">
               <a:rPr lang="en-US" smtClean="0"/>
               <a:pPr/>
-              <a:t>6/21/2017</a:t>
+              <a:t>8/23/2017</a:t>
             </a:fld>
             <a:endParaRPr lang="en-US" dirty="0"/>
           </a:p>
@@ -3859,8 +3867,8 @@
         </p:nvSpPr>
         <p:spPr>
           <a:xfrm>
-            <a:off x="3092723" y="3828874"/>
-            <a:ext cx="2703432" cy="646331"/>
+            <a:off x="3092725" y="3828874"/>
+            <a:ext cx="2703432" cy="1200329"/>
           </a:xfrm>
           <a:prstGeom prst="rect">
             <a:avLst/>
@@ -3876,14 +3884,28 @@
             <a:pPr algn="ctr"/>
             <a:r>
               <a:rPr lang="en-US" dirty="0" smtClean="0"/>
+              <a:t>Kirk S. Kalvar</a:t>
+            </a:r>
+          </a:p>
+          <a:p>
+            <a:pPr algn="ctr"/>
+            <a:r>
+              <a:rPr lang="en-US" dirty="0" smtClean="0"/>
+              <a:t>Senior Software Engineer</a:t>
+            </a:r>
+          </a:p>
+          <a:p>
+            <a:pPr algn="ctr"/>
+            <a:r>
+              <a:rPr lang="en-US" dirty="0" smtClean="0"/>
+              <a:t>KAL Technology</a:t>
+            </a:r>
+          </a:p>
+          <a:p>
+            <a:pPr algn="ctr"/>
+            <a:r>
+              <a:rPr lang="en-US" dirty="0" smtClean="0"/>
               <a:t>kirk.kalvar@kal.technology</a:t>
-            </a:r>
-          </a:p>
-          <a:p>
-            <a:pPr algn="ctr"/>
-            <a:r>
-              <a:rPr lang="en-US" dirty="0" smtClean="0"/>
-              <a:t>@kskalvar</a:t>
             </a:r>
           </a:p>
         </p:txBody>
@@ -3922,8 +3944,8 @@
         </p:nvSpPr>
         <p:spPr>
           <a:xfrm>
-            <a:off x="1610687" y="738230"/>
-            <a:ext cx="5704513" cy="1456330"/>
+            <a:off x="863468" y="1377382"/>
+            <a:ext cx="7390406" cy="728165"/>
           </a:xfrm>
           <a:prstGeom prst="rect">
             <a:avLst/>
@@ -4022,7 +4044,7 @@
           <a:p>
             <a:r>
               <a:rPr lang="en-US" dirty="0" smtClean="0"/>
-              <a:t>AWS IoT Console</a:t>
+              <a:t>AWS IoT Web Console</a:t>
             </a:r>
             <a:endParaRPr lang="en-US" dirty="0"/>
           </a:p>
@@ -4052,43 +4074,6 @@
           </a:prstGeom>
         </p:spPr>
       </p:pic>
-      <p:sp>
-        <p:nvSpPr>
-          <p:cNvPr id="4" name="TextBox 3"/>
-          <p:cNvSpPr txBox="1"/>
-          <p:nvPr/>
-        </p:nvSpPr>
-        <p:spPr>
-          <a:xfrm>
-            <a:off x="1263242" y="1373286"/>
-            <a:ext cx="6705600" cy="646331"/>
-          </a:xfrm>
-          <a:prstGeom prst="rect">
-            <a:avLst/>
-          </a:prstGeom>
-          <a:noFill/>
-        </p:spPr>
-        <p:txBody>
-          <a:bodyPr wrap="square" rtlCol="0">
-            <a:spAutoFit/>
-          </a:bodyPr>
-          <a:lstStyle/>
-          <a:p>
-            <a:r>
-              <a:rPr lang="en-US" dirty="0" smtClean="0"/>
-              <a:t>AWS IoT Device can be configured via the </a:t>
-            </a:r>
-            <a:r>
-              <a:rPr lang="en-US" dirty="0"/>
-              <a:t>AWS IoT </a:t>
-            </a:r>
-            <a:r>
-              <a:rPr lang="en-US" dirty="0" smtClean="0"/>
-              <a:t>Console or via the AWS CLI </a:t>
-            </a:r>
-          </a:p>
-        </p:txBody>
-      </p:sp>
       <p:pic>
         <p:nvPicPr>
           <p:cNvPr id="1026" name="Picture 2"/>
@@ -4112,7 +4097,7 @@
         </p:blipFill>
         <p:spPr bwMode="auto">
           <a:xfrm>
-            <a:off x="681772" y="2174917"/>
+            <a:off x="681772" y="1817458"/>
             <a:ext cx="7868540" cy="4206240"/>
           </a:xfrm>
           <a:prstGeom prst="rect">
@@ -4207,6 +4192,124 @@
           <a:p>
             <a:r>
               <a:rPr lang="en-US" dirty="0" smtClean="0"/>
+              <a:t>AWS IoT </a:t>
+            </a:r>
+            <a:r>
+              <a:rPr lang="en-US" dirty="0" smtClean="0"/>
+              <a:t>Rule</a:t>
+            </a:r>
+            <a:endParaRPr lang="en-US" dirty="0"/>
+          </a:p>
+        </p:txBody>
+      </p:sp>
+      <p:pic>
+        <p:nvPicPr>
+          <p:cNvPr id="3" name="Picture 2" descr="KAL-Logo.png"/>
+          <p:cNvPicPr>
+            <a:picLocks noChangeAspect="1"/>
+          </p:cNvPicPr>
+          <p:nvPr/>
+        </p:nvPicPr>
+        <p:blipFill>
+          <a:blip r:embed="rId2" cstate="print"/>
+          <a:stretch>
+            <a:fillRect/>
+          </a:stretch>
+        </p:blipFill>
+        <p:spPr>
+          <a:xfrm>
+            <a:off x="7848600" y="152400"/>
+            <a:ext cx="1143160" cy="762106"/>
+          </a:xfrm>
+          <a:prstGeom prst="rect">
+            <a:avLst/>
+          </a:prstGeom>
+        </p:spPr>
+      </p:pic>
+      <p:pic>
+        <p:nvPicPr>
+          <p:cNvPr id="4" name="Picture 3"/>
+          <p:cNvPicPr>
+            <a:picLocks noChangeAspect="1"/>
+          </p:cNvPicPr>
+          <p:nvPr/>
+        </p:nvPicPr>
+        <p:blipFill>
+          <a:blip r:embed="rId3">
+            <a:extLst>
+              <a:ext uri="{28A0092B-C50C-407E-A947-70E740481C1C}">
+                <a14:useLocalDpi xmlns:a14="http://schemas.microsoft.com/office/drawing/2010/main" val="0"/>
+              </a:ext>
+            </a:extLst>
+          </a:blip>
+          <a:stretch>
+            <a:fillRect/>
+          </a:stretch>
+        </p:blipFill>
+        <p:spPr>
+          <a:xfrm>
+            <a:off x="1395386" y="1262358"/>
+            <a:ext cx="6290521" cy="5120640"/>
+          </a:xfrm>
+          <a:prstGeom prst="rect">
+            <a:avLst/>
+          </a:prstGeom>
+        </p:spPr>
+      </p:pic>
+    </p:spTree>
+    <p:extLst>
+      <p:ext uri="{BB962C8B-B14F-4D97-AF65-F5344CB8AC3E}">
+        <p14:creationId xmlns:p14="http://schemas.microsoft.com/office/powerpoint/2010/main" val="1251890699"/>
+      </p:ext>
+    </p:extLst>
+  </p:cSld>
+  <p:clrMapOvr>
+    <a:masterClrMapping/>
+  </p:clrMapOvr>
+  <p:timing>
+    <p:tnLst>
+      <p:par>
+        <p:cTn id="1" dur="indefinite" restart="never" nodeType="tmRoot"/>
+      </p:par>
+    </p:tnLst>
+  </p:timing>
+</p:sld>
+</file>
+
+<file path=ppt/slides/slide12.xml><?xml version="1.0" encoding="utf-8"?>
+<p:sld xmlns:a="http://schemas.openxmlformats.org/drawingml/2006/main" xmlns:r="http://schemas.openxmlformats.org/officeDocument/2006/relationships" xmlns:p="http://schemas.openxmlformats.org/presentationml/2006/main">
+  <p:cSld>
+    <p:spTree>
+      <p:nvGrpSpPr>
+        <p:cNvPr id="1" name=""/>
+        <p:cNvGrpSpPr/>
+        <p:nvPr/>
+      </p:nvGrpSpPr>
+      <p:grpSpPr>
+        <a:xfrm>
+          <a:off x="0" y="0"/>
+          <a:ext cx="0" cy="0"/>
+          <a:chOff x="0" y="0"/>
+          <a:chExt cx="0" cy="0"/>
+        </a:xfrm>
+      </p:grpSpPr>
+      <p:sp>
+        <p:nvSpPr>
+          <p:cNvPr id="2" name="Title 1"/>
+          <p:cNvSpPr>
+            <a:spLocks noGrp="1"/>
+          </p:cNvSpPr>
+          <p:nvPr>
+            <p:ph type="title"/>
+          </p:nvPr>
+        </p:nvSpPr>
+        <p:spPr/>
+        <p:txBody>
+          <a:bodyPr/>
+          <a:lstStyle/>
+          <a:p>
+            <a:r>
+              <a:rPr lang="en-US" dirty="0" smtClean="0"/>
               <a:t>AWS IoT Rule Actions</a:t>
             </a:r>
             <a:endParaRPr lang="en-US" dirty="0"/>
@@ -4260,7 +4363,7 @@
         </p:blipFill>
         <p:spPr bwMode="auto">
           <a:xfrm>
-            <a:off x="2079040" y="1288435"/>
+            <a:off x="2079040" y="1196992"/>
             <a:ext cx="5014998" cy="5394960"/>
           </a:xfrm>
           <a:prstGeom prst="rect">
@@ -4321,7 +4424,7 @@
 </p:sld>
 </file>
 
-<file path=ppt/slides/slide12.xml><?xml version="1.0" encoding="utf-8"?>
+<file path=ppt/slides/slide13.xml><?xml version="1.0" encoding="utf-8"?>
 <p:sld xmlns:a="http://schemas.openxmlformats.org/drawingml/2006/main" xmlns:r="http://schemas.openxmlformats.org/officeDocument/2006/relationships" xmlns:p="http://schemas.openxmlformats.org/presentationml/2006/main">
   <p:cSld>
     <p:spTree>
@@ -4413,7 +4516,7 @@
             </a:pPr>
             <a:r>
               <a:rPr lang="en-US" dirty="0" smtClean="0"/>
-              <a:t>  Android Mobile Temperature Application with an Open/Close Window toggle and Temperature Scale</a:t>
+              <a:t>  Android Mobile Temperature Application with an Open/Close Toggle and Temperature Scale</a:t>
             </a:r>
           </a:p>
           <a:p>
@@ -4434,7 +4537,7 @@
             </a:r>
             <a:r>
               <a:rPr lang="en-US" dirty="0" smtClean="0"/>
-              <a:t>is configured  to communicate with AWS IoT authenticated via AWS Cognito</a:t>
+              <a:t>is configured  to communicate with AWS IoT and is  authenticated via AWS Cognito</a:t>
             </a:r>
           </a:p>
           <a:p>
@@ -4464,7 +4567,7 @@
             </a:pPr>
             <a:r>
               <a:rPr lang="en-US" dirty="0" smtClean="0"/>
-              <a:t>  We’ll use the Application to fire the following AWS IoT Rules:</a:t>
+              <a:t>  We’ll fire the following AWS IoT Rules:</a:t>
             </a:r>
           </a:p>
           <a:p>
@@ -4478,7 +4581,7 @@
             </a:r>
             <a:r>
               <a:rPr lang="en-US" dirty="0" smtClean="0"/>
-              <a:t> Use S3 to store shadow updates</a:t>
+              <a:t> S3 to store shadow updates</a:t>
             </a:r>
           </a:p>
           <a:p>
@@ -4492,7 +4595,7 @@
             </a:r>
             <a:r>
               <a:rPr lang="en-US" dirty="0" smtClean="0"/>
-              <a:t> Use Lambda to automatically close the window if the window is open and temperature &gt;  72 degrees</a:t>
+              <a:t> Lambda to close the window if the window is open and temperature &gt;  72 degrees</a:t>
             </a:r>
           </a:p>
           <a:p>
@@ -4506,7 +4609,7 @@
             </a:r>
             <a:r>
               <a:rPr lang="en-US" dirty="0" smtClean="0"/>
-              <a:t> Use Elastic Search as a near real-time “Dashboard”</a:t>
+              <a:t> Elasticsearch as a near real-time “Dashboard”</a:t>
             </a:r>
           </a:p>
         </p:txBody>
@@ -4526,7 +4629,7 @@
 </p:sld>
 </file>
 
-<file path=ppt/slides/slide13.xml><?xml version="1.0" encoding="utf-8"?>
+<file path=ppt/slides/slide14.xml><?xml version="1.0" encoding="utf-8"?>
 <p:sld xmlns:a="http://schemas.openxmlformats.org/drawingml/2006/main" xmlns:r="http://schemas.openxmlformats.org/officeDocument/2006/relationships" xmlns:p="http://schemas.openxmlformats.org/presentationml/2006/main">
   <p:cSld>
     <p:spTree>
@@ -4638,7 +4741,7 @@
             <a:lstStyle/>
             <a:p>
               <a:pPr algn="ctr"/>
-              <a:endParaRPr lang="en-US"/>
+              <a:endParaRPr lang="en-US" dirty="0"/>
             </a:p>
           </p:txBody>
         </p:sp>
@@ -4721,7 +4824,7 @@
             <a:lstStyle/>
             <a:p>
               <a:pPr algn="ctr"/>
-              <a:endParaRPr lang="en-US"/>
+              <a:endParaRPr lang="en-US" dirty="0"/>
             </a:p>
           </p:txBody>
         </p:sp>
@@ -4804,7 +4907,7 @@
             <a:lstStyle/>
             <a:p>
               <a:pPr algn="ctr"/>
-              <a:endParaRPr lang="en-US"/>
+              <a:endParaRPr lang="en-US" dirty="0"/>
             </a:p>
           </p:txBody>
         </p:sp>
@@ -4887,7 +4990,7 @@
             <a:lstStyle/>
             <a:p>
               <a:pPr algn="ctr"/>
-              <a:endParaRPr lang="en-US"/>
+              <a:endParaRPr lang="en-US" dirty="0"/>
             </a:p>
           </p:txBody>
         </p:sp>
@@ -4931,9 +5034,9 @@
         <p:grpSpPr>
           <a:xfrm>
             <a:off x="5105400" y="4214571"/>
-            <a:ext cx="1943032" cy="1283732"/>
+            <a:ext cx="1874103" cy="1283732"/>
             <a:chOff x="6324600" y="4507468"/>
-            <a:chExt cx="1943032" cy="1283732"/>
+            <a:chExt cx="1874103" cy="1283732"/>
           </a:xfrm>
         </p:grpSpPr>
         <p:sp>
@@ -4970,7 +5073,7 @@
             <a:lstStyle/>
             <a:p>
               <a:pPr algn="ctr"/>
-              <a:endParaRPr lang="en-US"/>
+              <a:endParaRPr lang="en-US" dirty="0"/>
             </a:p>
           </p:txBody>
         </p:sp>
@@ -4983,7 +5086,7 @@
           <p:spPr>
             <a:xfrm>
               <a:off x="6324600" y="4507468"/>
-              <a:ext cx="1943032" cy="369332"/>
+              <a:ext cx="1874103" cy="369332"/>
             </a:xfrm>
             <a:prstGeom prst="rect">
               <a:avLst/>
@@ -4998,7 +5101,7 @@
             <a:p>
               <a:r>
                 <a:rPr lang="en-US" dirty="0" smtClean="0"/>
-                <a:t>AWS Elastic Search</a:t>
+                <a:t>AWS Elasticsearch</a:t>
               </a:r>
               <a:endParaRPr lang="en-US" dirty="0"/>
             </a:p>
@@ -5151,6 +5254,36 @@
           </a:fontRef>
         </p:style>
       </p:cxnSp>
+      <p:sp>
+        <p:nvSpPr>
+          <p:cNvPr id="2" name="TextBox 1"/>
+          <p:cNvSpPr txBox="1"/>
+          <p:nvPr/>
+        </p:nvSpPr>
+        <p:spPr>
+          <a:xfrm>
+            <a:off x="2829309" y="3341716"/>
+            <a:ext cx="505267" cy="246221"/>
+          </a:xfrm>
+          <a:prstGeom prst="rect">
+            <a:avLst/>
+          </a:prstGeom>
+          <a:noFill/>
+        </p:spPr>
+        <p:txBody>
+          <a:bodyPr wrap="none" rtlCol="0">
+            <a:spAutoFit/>
+          </a:bodyPr>
+          <a:lstStyle/>
+          <a:p>
+            <a:r>
+              <a:rPr lang="en-US" sz="1000" dirty="0" smtClean="0"/>
+              <a:t>MQTT</a:t>
+            </a:r>
+            <a:endParaRPr lang="en-US" sz="1000" dirty="0"/>
+          </a:p>
+        </p:txBody>
+      </p:sp>
     </p:spTree>
     <p:extLst>
       <p:ext uri="{BB962C8B-B14F-4D97-AF65-F5344CB8AC3E}">
@@ -5171,7 +5304,7 @@
 </p:sld>
 </file>
 
-<file path=ppt/slides/slide14.xml><?xml version="1.0" encoding="utf-8"?>
+<file path=ppt/slides/slide15.xml><?xml version="1.0" encoding="utf-8"?>
 <p:sld xmlns:a="http://schemas.openxmlformats.org/drawingml/2006/main" xmlns:r="http://schemas.openxmlformats.org/officeDocument/2006/relationships" xmlns:p="http://schemas.openxmlformats.org/presentationml/2006/main">
   <p:cSld>
     <p:spTree>
@@ -5243,8 +5376,8 @@
         </p:nvSpPr>
         <p:spPr>
           <a:xfrm>
-            <a:off x="1447800" y="1421094"/>
-            <a:ext cx="6096000" cy="3416320"/>
+            <a:off x="749507" y="1421094"/>
+            <a:ext cx="6898201" cy="3139321"/>
           </a:xfrm>
           <a:prstGeom prst="rect">
             <a:avLst/>
@@ -5291,7 +5424,7 @@
             </a:r>
             <a:r>
               <a:rPr lang="en-US" dirty="0" smtClean="0"/>
-              <a:t> Quick Prototyping</a:t>
+              <a:t> Fairly Quick Prototyping</a:t>
             </a:r>
           </a:p>
           <a:p>
@@ -5403,7 +5536,7 @@
             </a:r>
             <a:r>
               <a:rPr lang="en-US" dirty="0" smtClean="0"/>
-              <a:t> Configuration Requires Jumping Through Hoops with Multiple Services</a:t>
+              <a:t> Requires Jumping Through Hoops Configuring Multiple Services</a:t>
             </a:r>
           </a:p>
         </p:txBody>
@@ -5423,7 +5556,7 @@
 </p:sld>
 </file>
 
-<file path=ppt/slides/slide15.xml><?xml version="1.0" encoding="utf-8"?>
+<file path=ppt/slides/slide16.xml><?xml version="1.0" encoding="utf-8"?>
 <p:sld xmlns:a="http://schemas.openxmlformats.org/drawingml/2006/main" xmlns:r="http://schemas.openxmlformats.org/officeDocument/2006/relationships" xmlns:p="http://schemas.openxmlformats.org/presentationml/2006/main">
   <p:cSld>
     <p:spTree>
@@ -5507,7 +5640,7 @@
 </p:sld>
 </file>
 
-<file path=ppt/slides/slide16.xml><?xml version="1.0" encoding="utf-8"?>
+<file path=ppt/slides/slide17.xml><?xml version="1.0" encoding="utf-8"?>
 <p:sld xmlns:a="http://schemas.openxmlformats.org/drawingml/2006/main" xmlns:r="http://schemas.openxmlformats.org/officeDocument/2006/relationships" xmlns:p="http://schemas.openxmlformats.org/presentationml/2006/main">
   <p:cSld>
     <p:spTree>
@@ -5669,130 +5802,6 @@
 </file>
 
 <file path=ppt/slides/slide2.xml><?xml version="1.0" encoding="utf-8"?>
-<p:sld xmlns:a="http://schemas.openxmlformats.org/drawingml/2006/main" xmlns:r="http://schemas.openxmlformats.org/officeDocument/2006/relationships" xmlns:p="http://schemas.openxmlformats.org/presentationml/2006/main">
-  <p:cSld>
-    <p:spTree>
-      <p:nvGrpSpPr>
-        <p:cNvPr id="1" name=""/>
-        <p:cNvGrpSpPr/>
-        <p:nvPr/>
-      </p:nvGrpSpPr>
-      <p:grpSpPr>
-        <a:xfrm>
-          <a:off x="0" y="0"/>
-          <a:ext cx="0" cy="0"/>
-          <a:chOff x="0" y="0"/>
-          <a:chExt cx="0" cy="0"/>
-        </a:xfrm>
-      </p:grpSpPr>
-      <p:sp>
-        <p:nvSpPr>
-          <p:cNvPr id="3" name="TextBox 2"/>
-          <p:cNvSpPr txBox="1"/>
-          <p:nvPr/>
-        </p:nvSpPr>
-        <p:spPr>
-          <a:xfrm>
-            <a:off x="1447800" y="1824468"/>
-            <a:ext cx="6705600" cy="923330"/>
-          </a:xfrm>
-          <a:prstGeom prst="rect">
-            <a:avLst/>
-          </a:prstGeom>
-          <a:noFill/>
-        </p:spPr>
-        <p:txBody>
-          <a:bodyPr wrap="square" rtlCol="0">
-            <a:spAutoFit/>
-          </a:bodyPr>
-          <a:lstStyle/>
-          <a:p>
-            <a:pPr>
-              <a:buFont typeface="Arial" pitchFamily="34" charset="0"/>
-              <a:buChar char="•"/>
-            </a:pPr>
-            <a:r>
-              <a:rPr lang="en-US" dirty="0" smtClean="0"/>
-              <a:t>  Senior Software Engineer</a:t>
-            </a:r>
-          </a:p>
-          <a:p>
-            <a:pPr>
-              <a:buFont typeface="Arial" pitchFamily="34" charset="0"/>
-              <a:buChar char="•"/>
-            </a:pPr>
-            <a:r>
-              <a:rPr lang="en-US" dirty="0" smtClean="0"/>
-              <a:t>  Focused on Open Source Solutions</a:t>
-            </a:r>
-          </a:p>
-          <a:p>
-            <a:endParaRPr lang="en-US" dirty="0" smtClean="0"/>
-          </a:p>
-        </p:txBody>
-      </p:sp>
-      <p:pic>
-        <p:nvPicPr>
-          <p:cNvPr id="5" name="Picture 4" descr="KAL-Logo.png"/>
-          <p:cNvPicPr>
-            <a:picLocks noChangeAspect="1"/>
-          </p:cNvPicPr>
-          <p:nvPr/>
-        </p:nvPicPr>
-        <p:blipFill>
-          <a:blip r:embed="rId2" cstate="print"/>
-          <a:stretch>
-            <a:fillRect/>
-          </a:stretch>
-        </p:blipFill>
-        <p:spPr>
-          <a:xfrm>
-            <a:off x="7848600" y="152400"/>
-            <a:ext cx="1143160" cy="762106"/>
-          </a:xfrm>
-          <a:prstGeom prst="rect">
-            <a:avLst/>
-          </a:prstGeom>
-        </p:spPr>
-      </p:pic>
-      <p:sp>
-        <p:nvSpPr>
-          <p:cNvPr id="8" name="Title 7"/>
-          <p:cNvSpPr>
-            <a:spLocks noGrp="1"/>
-          </p:cNvSpPr>
-          <p:nvPr>
-            <p:ph type="title"/>
-          </p:nvPr>
-        </p:nvSpPr>
-        <p:spPr/>
-        <p:txBody>
-          <a:bodyPr/>
-          <a:lstStyle/>
-          <a:p>
-            <a:r>
-              <a:rPr lang="en-US" dirty="0"/>
-              <a:t>Introduction</a:t>
-            </a:r>
-          </a:p>
-        </p:txBody>
-      </p:sp>
-    </p:spTree>
-  </p:cSld>
-  <p:clrMapOvr>
-    <a:masterClrMapping/>
-  </p:clrMapOvr>
-  <p:timing>
-    <p:tnLst>
-      <p:par>
-        <p:cTn id="1" dur="indefinite" restart="never" nodeType="tmRoot"/>
-      </p:par>
-    </p:tnLst>
-  </p:timing>
-</p:sld>
-</file>
-
-<file path=ppt/slides/slide3.xml><?xml version="1.0" encoding="utf-8"?>
 <p:sld xmlns:a="http://schemas.openxmlformats.org/drawingml/2006/main" xmlns:r="http://schemas.openxmlformats.org/officeDocument/2006/relationships" xmlns:p="http://schemas.openxmlformats.org/presentationml/2006/main">
   <p:cSld>
     <p:spTree>
@@ -5903,7 +5912,7 @@
 </p:sld>
 </file>
 
-<file path=ppt/slides/slide4.xml><?xml version="1.0" encoding="utf-8"?>
+<file path=ppt/slides/slide3.xml><?xml version="1.0" encoding="utf-8"?>
 <p:sld xmlns:a="http://schemas.openxmlformats.org/drawingml/2006/main" xmlns:r="http://schemas.openxmlformats.org/officeDocument/2006/relationships" xmlns:p="http://schemas.openxmlformats.org/presentationml/2006/main">
   <p:cSld>
     <p:spTree>
@@ -5954,7 +5963,7 @@
         <p:spPr>
           <a:xfrm>
             <a:off x="933840" y="1442865"/>
-            <a:ext cx="7169265" cy="1200329"/>
+            <a:ext cx="7169265" cy="923330"/>
           </a:xfrm>
           <a:prstGeom prst="rect">
             <a:avLst/>
@@ -5973,7 +5982,7 @@
             </a:pPr>
             <a:r>
               <a:rPr lang="en-US" dirty="0" smtClean="0"/>
-              <a:t>  Fragmented Industry</a:t>
+              <a:t>  Highly Fragmented Industry</a:t>
             </a:r>
           </a:p>
           <a:p>
@@ -5997,21 +6006,7 @@
             </a:pPr>
             <a:r>
               <a:rPr lang="en-US" dirty="0" smtClean="0"/>
-              <a:t>  Have Limited Resources</a:t>
-            </a:r>
-          </a:p>
-          <a:p>
-            <a:pPr>
-              <a:buFont typeface="Arial" pitchFamily="34" charset="0"/>
-              <a:buChar char="•"/>
-            </a:pPr>
-            <a:r>
-              <a:rPr lang="en-US" dirty="0"/>
-              <a:t> </a:t>
-            </a:r>
-            <a:r>
-              <a:rPr lang="en-US" dirty="0" smtClean="0"/>
-              <a:t> Are Cost Sensitive</a:t>
+              <a:t>  Resource Constraints</a:t>
             </a:r>
           </a:p>
         </p:txBody>
@@ -6060,7 +6055,7 @@
 </p:sld>
 </file>
 
-<file path=ppt/slides/slide5.xml><?xml version="1.0" encoding="utf-8"?>
+<file path=ppt/slides/slide4.xml><?xml version="1.0" encoding="utf-8"?>
 <p:sld xmlns:a="http://schemas.openxmlformats.org/drawingml/2006/main" xmlns:r="http://schemas.openxmlformats.org/officeDocument/2006/relationships" xmlns:p="http://schemas.openxmlformats.org/presentationml/2006/main">
   <p:cSld>
     <p:spTree>
@@ -6094,7 +6089,7 @@
           <a:p>
             <a:r>
               <a:rPr lang="en-US" dirty="0" smtClean="0"/>
-              <a:t>Why AWS IoT?</a:t>
+              <a:t>Why Use AWS IoT?</a:t>
             </a:r>
             <a:endParaRPr lang="en-US" dirty="0"/>
           </a:p>
@@ -6128,7 +6123,7 @@
             </a:pPr>
             <a:r>
               <a:rPr lang="en-US" dirty="0" smtClean="0"/>
-              <a:t>  Cloud Provider of Choice</a:t>
+              <a:t>  Experience with AWS</a:t>
             </a:r>
           </a:p>
           <a:p>
@@ -6138,16 +6133,13 @@
             </a:pPr>
             <a:r>
               <a:rPr lang="en-US" dirty="0" smtClean="0"/>
-              <a:t>  Configurable with </a:t>
-            </a:r>
-            <a:r>
-              <a:rPr lang="en-US" dirty="0"/>
-              <a:t>AWS IoT </a:t>
+              <a:t>  Configurable via Web </a:t>
             </a:r>
             <a:r>
               <a:rPr lang="en-US" dirty="0" smtClean="0"/>
-              <a:t>Console or AWS CLI</a:t>
-            </a:r>
+              <a:t>Console, CLI, or CloudFormation</a:t>
+            </a:r>
+            <a:endParaRPr lang="en-US" dirty="0" smtClean="0"/>
           </a:p>
           <a:p>
             <a:pPr lvl="0">
@@ -6160,7 +6152,7 @@
             </a:r>
             <a:r>
               <a:rPr lang="en-US" dirty="0" smtClean="0"/>
-              <a:t> Quick Prototyping </a:t>
+              <a:t> Quick Prototyping</a:t>
             </a:r>
           </a:p>
           <a:p>
@@ -6256,7 +6248,7 @@
 </p:sld>
 </file>
 
-<file path=ppt/slides/slide6.xml><?xml version="1.0" encoding="utf-8"?>
+<file path=ppt/slides/slide5.xml><?xml version="1.0" encoding="utf-8"?>
 <p:sld xmlns:a="http://schemas.openxmlformats.org/drawingml/2006/main" xmlns:r="http://schemas.openxmlformats.org/officeDocument/2006/relationships" xmlns:p="http://schemas.openxmlformats.org/presentationml/2006/main">
   <p:cSld>
     <p:spTree>
@@ -6333,13 +6325,14 @@
               <a:buChar char="•"/>
             </a:pPr>
             <a:r>
+              <a:rPr lang="en-US" dirty="0" smtClean="0"/>
+              <a:t>  Minimal </a:t>
+            </a:r>
+            <a:r>
               <a:rPr lang="en-US" dirty="0"/>
-              <a:t> </a:t>
-            </a:r>
-            <a:r>
-              <a:rPr lang="en-US" dirty="0" smtClean="0"/>
-              <a:t> Leverage current skill set (Java/Android/AWS)</a:t>
-            </a:r>
+              <a:t>Viable Product (MVP) Approach</a:t>
+            </a:r>
+            <a:endParaRPr lang="en-US" dirty="0" smtClean="0"/>
           </a:p>
           <a:p>
             <a:pPr lvl="0">
@@ -6352,7 +6345,7 @@
             </a:r>
             <a:r>
               <a:rPr lang="en-US" dirty="0" smtClean="0"/>
-              <a:t> Use as much existing code as possible</a:t>
+              <a:t> Leverage current skill set (Java/Android/AWS)</a:t>
             </a:r>
           </a:p>
           <a:p>
@@ -6366,7 +6359,7 @@
             </a:r>
             <a:r>
               <a:rPr lang="en-US" dirty="0" smtClean="0"/>
-              <a:t> Use Minimal Viable Product (MVP) Approach</a:t>
+              <a:t> Code Reuse</a:t>
             </a:r>
           </a:p>
         </p:txBody>
@@ -6415,7 +6408,7 @@
 </p:sld>
 </file>
 
-<file path=ppt/slides/slide7.xml><?xml version="1.0" encoding="utf-8"?>
+<file path=ppt/slides/slide6.xml><?xml version="1.0" encoding="utf-8"?>
 <p:sld xmlns:a="http://schemas.openxmlformats.org/drawingml/2006/main" xmlns:r="http://schemas.openxmlformats.org/officeDocument/2006/relationships" xmlns:p="http://schemas.openxmlformats.org/presentationml/2006/main">
   <p:cSld>
     <p:spTree>
@@ -6535,7 +6528,7 @@
 </p:sld>
 </file>
 
-<file path=ppt/slides/slide8.xml><?xml version="1.0" encoding="utf-8"?>
+<file path=ppt/slides/slide7.xml><?xml version="1.0" encoding="utf-8"?>
 <p:sld xmlns:a="http://schemas.openxmlformats.org/drawingml/2006/main" xmlns:r="http://schemas.openxmlformats.org/officeDocument/2006/relationships" xmlns:p="http://schemas.openxmlformats.org/presentationml/2006/main">
   <p:cSld>
     <p:spTree>
@@ -6569,7 +6562,7 @@
           <a:p>
             <a:r>
               <a:rPr lang="en-US" dirty="0" smtClean="0"/>
-              <a:t>Device Shadow Document</a:t>
+              <a:t>Device Shadows Documents</a:t>
             </a:r>
             <a:endParaRPr lang="en-US" dirty="0"/>
           </a:p>
@@ -6622,51 +6615,92 @@
           <a:lstStyle/>
           <a:p>
             <a:r>
-              <a:rPr lang="en-US" sz="1600" dirty="0" smtClean="0"/>
+              <a:rPr lang="en-US" sz="1600" dirty="0" smtClean="0">
+                <a:solidFill>
+                  <a:prstClr val="black"/>
+                </a:solidFill>
+              </a:rPr>
               <a:t>Devices report </a:t>
             </a:r>
             <a:r>
-              <a:rPr lang="en-US" sz="1600" dirty="0"/>
-              <a:t>their state by publishing </a:t>
-            </a:r>
-            <a:r>
-              <a:rPr lang="en-US" sz="1600" dirty="0" smtClean="0"/>
+              <a:rPr lang="en-US" sz="1600" dirty="0">
+                <a:solidFill>
+                  <a:prstClr val="black"/>
+                </a:solidFill>
+              </a:rPr>
+              <a:t>their </a:t>
+            </a:r>
+            <a:r>
+              <a:rPr lang="en-US" sz="1600" b="1" i="1" dirty="0">
+                <a:solidFill>
+                  <a:prstClr val="black"/>
+                </a:solidFill>
+              </a:rPr>
+              <a:t>state</a:t>
+            </a:r>
+            <a:r>
+              <a:rPr lang="en-US" sz="1600" dirty="0">
+                <a:solidFill>
+                  <a:prstClr val="black"/>
+                </a:solidFill>
+              </a:rPr>
+              <a:t> by publishing </a:t>
+            </a:r>
+            <a:r>
+              <a:rPr lang="en-US" sz="1600" dirty="0" smtClean="0">
+                <a:solidFill>
+                  <a:prstClr val="black"/>
+                </a:solidFill>
+              </a:rPr>
               <a:t>messages in </a:t>
             </a:r>
             <a:r>
-              <a:rPr lang="en-US" sz="1600" dirty="0"/>
-              <a:t>JSON </a:t>
-            </a:r>
-            <a:r>
-              <a:rPr lang="en-US" sz="1600" dirty="0" smtClean="0"/>
-              <a:t>format on </a:t>
-            </a:r>
-            <a:r>
-              <a:rPr lang="en-US" sz="1600" dirty="0"/>
+              <a:rPr lang="en-US" sz="1600" b="1" i="1" dirty="0" smtClean="0">
+                <a:solidFill>
+                  <a:prstClr val="black"/>
+                </a:solidFill>
+              </a:rPr>
+              <a:t>JSON format on </a:t>
+            </a:r>
+            <a:r>
+              <a:rPr lang="en-US" sz="1600" b="1" i="1" dirty="0">
+                <a:solidFill>
+                  <a:prstClr val="black"/>
+                </a:solidFill>
+              </a:rPr>
               <a:t>MQTT </a:t>
             </a:r>
             <a:r>
-              <a:rPr lang="en-US" sz="1600" dirty="0" smtClean="0"/>
-              <a:t>topics.  A shadow </a:t>
-            </a:r>
-            <a:r>
-              <a:rPr lang="en-US" sz="1600" dirty="0"/>
+              <a:rPr lang="en-US" sz="1600" b="1" i="1" dirty="0" smtClean="0">
+                <a:solidFill>
+                  <a:prstClr val="black"/>
+                </a:solidFill>
+              </a:rPr>
+              <a:t>topics</a:t>
+            </a:r>
+            <a:r>
+              <a:rPr lang="en-US" sz="1600" dirty="0" smtClean="0">
+                <a:solidFill>
+                  <a:prstClr val="black"/>
+                </a:solidFill>
+              </a:rPr>
+              <a:t>.  A shadow </a:t>
+            </a:r>
+            <a:r>
+              <a:rPr lang="en-US" sz="1600" dirty="0">
+                <a:solidFill>
+                  <a:prstClr val="black"/>
+                </a:solidFill>
+              </a:rPr>
               <a:t>document has the following properties:</a:t>
             </a:r>
           </a:p>
           <a:p>
-            <a:endParaRPr lang="en-US" sz="1600" dirty="0" smtClean="0"/>
-          </a:p>
-          <a:p>
-            <a:pPr marL="285750" indent="-285750">
-              <a:buFont typeface="Arial" pitchFamily="34" charset="0"/>
-              <a:buChar char="•"/>
-            </a:pPr>
-            <a:r>
-              <a:rPr lang="en-US" sz="1600" dirty="0" smtClean="0"/>
-              <a:t>state</a:t>
-            </a:r>
-            <a:endParaRPr lang="en-US" sz="1600" dirty="0"/>
+            <a:endParaRPr lang="en-US" sz="1600" dirty="0" smtClean="0">
+              <a:solidFill>
+                <a:prstClr val="black"/>
+              </a:solidFill>
+            </a:endParaRPr>
           </a:p>
           <a:p>
             <a:pPr marL="742950" lvl="1" indent="-285750">
@@ -6674,18 +6708,150 @@
               <a:buChar char="•"/>
             </a:pPr>
             <a:r>
-              <a:rPr lang="en-US" sz="1600" dirty="0" smtClean="0"/>
-              <a:t>desired:  applications </a:t>
-            </a:r>
-            <a:r>
-              <a:rPr lang="en-US" sz="1600" dirty="0"/>
-              <a:t>can write to this portion of the document to update the </a:t>
-            </a:r>
-            <a:r>
-              <a:rPr lang="en-US" sz="1600" dirty="0" smtClean="0"/>
+              <a:rPr lang="en-US" sz="1600" b="1" dirty="0" smtClean="0">
+                <a:solidFill>
+                  <a:prstClr val="black"/>
+                </a:solidFill>
+              </a:rPr>
+              <a:t>State:</a:t>
+            </a:r>
+            <a:endParaRPr lang="en-US" sz="1600" b="1" dirty="0">
+              <a:solidFill>
+                <a:prstClr val="black"/>
+              </a:solidFill>
+            </a:endParaRPr>
+          </a:p>
+          <a:p>
+            <a:pPr marL="1200150" lvl="2" indent="-285750">
+              <a:buFont typeface="Arial" pitchFamily="34" charset="0"/>
+              <a:buChar char="•"/>
+            </a:pPr>
+            <a:r>
+              <a:rPr lang="en-US" sz="1600" b="1" dirty="0" smtClean="0">
+                <a:solidFill>
+                  <a:srgbClr val="00B050"/>
+                </a:solidFill>
+              </a:rPr>
+              <a:t>Desired</a:t>
+            </a:r>
+            <a:r>
+              <a:rPr lang="en-US" sz="1600" dirty="0" smtClean="0">
+                <a:solidFill>
+                  <a:prstClr val="black"/>
+                </a:solidFill>
+              </a:rPr>
+              <a:t>:  applications write </a:t>
+            </a:r>
+            <a:r>
+              <a:rPr lang="en-US" sz="1600" dirty="0">
+                <a:solidFill>
+                  <a:prstClr val="black"/>
+                </a:solidFill>
+              </a:rPr>
+              <a:t>to this portion of the document to update the </a:t>
+            </a:r>
+            <a:r>
+              <a:rPr lang="en-US" sz="1600" dirty="0" smtClean="0">
+                <a:solidFill>
+                  <a:prstClr val="black"/>
+                </a:solidFill>
+              </a:rPr>
               <a:t>state</a:t>
             </a:r>
-            <a:endParaRPr lang="en-US" sz="1600" dirty="0"/>
+            <a:endParaRPr lang="en-US" sz="1600" dirty="0">
+              <a:solidFill>
+                <a:prstClr val="black"/>
+              </a:solidFill>
+            </a:endParaRPr>
+          </a:p>
+          <a:p>
+            <a:pPr marL="1200150" lvl="2" indent="-285750">
+              <a:buFont typeface="Arial" pitchFamily="34" charset="0"/>
+              <a:buChar char="•"/>
+            </a:pPr>
+            <a:r>
+              <a:rPr lang="en-US" sz="1600" b="1" dirty="0" smtClean="0">
+                <a:solidFill>
+                  <a:srgbClr val="FF0000"/>
+                </a:solidFill>
+              </a:rPr>
+              <a:t>Reported</a:t>
+            </a:r>
+            <a:r>
+              <a:rPr lang="en-US" sz="1600" dirty="0" smtClean="0">
+                <a:solidFill>
+                  <a:prstClr val="black"/>
+                </a:solidFill>
+              </a:rPr>
+              <a:t>:  applications </a:t>
+            </a:r>
+            <a:r>
+              <a:rPr lang="en-US" sz="1600" dirty="0">
+                <a:solidFill>
+                  <a:prstClr val="black"/>
+                </a:solidFill>
+              </a:rPr>
+              <a:t>read this portion of the document to determine the </a:t>
+            </a:r>
+            <a:r>
+              <a:rPr lang="en-US" sz="1600" dirty="0" smtClean="0">
+                <a:solidFill>
+                  <a:prstClr val="black"/>
+                </a:solidFill>
+              </a:rPr>
+              <a:t>state</a:t>
+            </a:r>
+          </a:p>
+          <a:p>
+            <a:pPr marL="1200150" lvl="2" indent="-285750">
+              <a:buFont typeface="Arial" pitchFamily="34" charset="0"/>
+              <a:buChar char="•"/>
+            </a:pPr>
+            <a:r>
+              <a:rPr lang="en-US" sz="1600" b="1" dirty="0" smtClean="0">
+                <a:solidFill>
+                  <a:srgbClr val="0070C0"/>
+                </a:solidFill>
+              </a:rPr>
+              <a:t>Delta</a:t>
+            </a:r>
+            <a:r>
+              <a:rPr lang="en-US" sz="1600" dirty="0">
+                <a:solidFill>
+                  <a:prstClr val="black"/>
+                </a:solidFill>
+              </a:rPr>
+              <a:t>:  </a:t>
+            </a:r>
+            <a:r>
+              <a:rPr lang="en-US" sz="1600" dirty="0" smtClean="0">
+                <a:solidFill>
+                  <a:prstClr val="black"/>
+                </a:solidFill>
+              </a:rPr>
+              <a:t>contains </a:t>
+            </a:r>
+            <a:r>
+              <a:rPr lang="en-US" sz="1600" dirty="0">
+                <a:solidFill>
+                  <a:prstClr val="black"/>
+                </a:solidFill>
+              </a:rPr>
+              <a:t>the difference between the desired and reported states.</a:t>
+            </a:r>
+            <a:endParaRPr lang="en-US" sz="1600" dirty="0" smtClean="0">
+              <a:solidFill>
+                <a:prstClr val="black"/>
+              </a:solidFill>
+            </a:endParaRPr>
+          </a:p>
+          <a:p>
+            <a:pPr lvl="2"/>
+            <a:endParaRPr lang="en-US" sz="1600" dirty="0">
+              <a:solidFill>
+                <a:prstClr val="black"/>
+              </a:solidFill>
+            </a:endParaRPr>
           </a:p>
           <a:p>
             <a:pPr marL="742950" lvl="1" indent="-285750">
@@ -6693,17 +6859,45 @@
               <a:buChar char="•"/>
             </a:pPr>
             <a:r>
-              <a:rPr lang="en-US" sz="1600" dirty="0" smtClean="0"/>
-              <a:t>reported:  applications </a:t>
-            </a:r>
-            <a:r>
-              <a:rPr lang="en-US" sz="1600" dirty="0"/>
-              <a:t>read this portion of the document to determine the state of a </a:t>
-            </a:r>
-            <a:r>
-              <a:rPr lang="en-US" sz="1600" dirty="0" smtClean="0"/>
-              <a:t>thing</a:t>
-            </a:r>
+              <a:rPr lang="en-US" sz="1600" b="1" dirty="0" smtClean="0">
+                <a:solidFill>
+                  <a:prstClr val="black"/>
+                </a:solidFill>
+              </a:rPr>
+              <a:t>Metadata</a:t>
+            </a:r>
+            <a:r>
+              <a:rPr lang="en-US" sz="1600" dirty="0" smtClean="0">
+                <a:solidFill>
+                  <a:prstClr val="black"/>
+                </a:solidFill>
+              </a:rPr>
+              <a:t>: </a:t>
+            </a:r>
+            <a:r>
+              <a:rPr lang="en-US" sz="1600" dirty="0">
+                <a:solidFill>
+                  <a:prstClr val="black"/>
+                </a:solidFill>
+              </a:rPr>
+              <a:t>Information about the data stored in the state section of the </a:t>
+            </a:r>
+            <a:r>
+              <a:rPr lang="en-US" sz="1600" dirty="0" smtClean="0">
+                <a:solidFill>
+                  <a:prstClr val="black"/>
+                </a:solidFill>
+              </a:rPr>
+              <a:t>document</a:t>
+            </a:r>
+          </a:p>
+          <a:p>
+            <a:pPr lvl="1"/>
+            <a:endParaRPr lang="en-US" sz="1600" dirty="0">
+              <a:solidFill>
+                <a:prstClr val="black"/>
+              </a:solidFill>
+            </a:endParaRPr>
           </a:p>
           <a:p>
             <a:pPr marL="742950" lvl="1" indent="-285750">
@@ -6711,76 +6905,73 @@
               <a:buChar char="•"/>
             </a:pPr>
             <a:r>
-              <a:rPr lang="en-US" sz="1600" dirty="0"/>
-              <a:t>delta:  </a:t>
-            </a:r>
-            <a:r>
-              <a:rPr lang="en-US" sz="1600" dirty="0" smtClean="0"/>
-              <a:t>contains </a:t>
-            </a:r>
-            <a:r>
-              <a:rPr lang="en-US" sz="1600" dirty="0"/>
-              <a:t>the difference between the desired and reported states.</a:t>
-            </a:r>
-            <a:endParaRPr lang="en-US" sz="1600" dirty="0" smtClean="0"/>
+              <a:rPr lang="en-US" sz="1600" b="1" dirty="0" smtClean="0">
+                <a:solidFill>
+                  <a:prstClr val="black"/>
+                </a:solidFill>
+              </a:rPr>
+              <a:t>Timestamp</a:t>
+            </a:r>
+            <a:r>
+              <a:rPr lang="en-US" sz="1600" dirty="0" smtClean="0">
+                <a:solidFill>
+                  <a:prstClr val="black"/>
+                </a:solidFill>
+              </a:rPr>
+              <a:t>: </a:t>
+            </a:r>
+            <a:r>
+              <a:rPr lang="en-US" sz="1600" dirty="0">
+                <a:solidFill>
+                  <a:prstClr val="black"/>
+                </a:solidFill>
+              </a:rPr>
+              <a:t>when the message was transmitted by AWS </a:t>
+            </a:r>
+            <a:r>
+              <a:rPr lang="en-US" sz="1600" dirty="0" smtClean="0">
+                <a:solidFill>
+                  <a:prstClr val="black"/>
+                </a:solidFill>
+              </a:rPr>
+              <a:t>IoT</a:t>
+            </a:r>
           </a:p>
           <a:p>
             <a:pPr lvl="1"/>
-            <a:endParaRPr lang="en-US" sz="1600" dirty="0"/>
-          </a:p>
-          <a:p>
-            <a:pPr marL="285750" indent="-285750">
+            <a:endParaRPr lang="en-US" sz="1600" dirty="0">
+              <a:solidFill>
+                <a:prstClr val="black"/>
+              </a:solidFill>
+            </a:endParaRPr>
+          </a:p>
+          <a:p>
+            <a:pPr marL="742950" lvl="1" indent="-285750">
               <a:buFont typeface="Arial" pitchFamily="34" charset="0"/>
               <a:buChar char="•"/>
             </a:pPr>
             <a:r>
-              <a:rPr lang="en-US" sz="1600" dirty="0" smtClean="0"/>
-              <a:t>metadata: </a:t>
-            </a:r>
-            <a:r>
-              <a:rPr lang="en-US" sz="1600" dirty="0"/>
-              <a:t>Information about the data stored in the state section of the </a:t>
-            </a:r>
-            <a:r>
-              <a:rPr lang="en-US" sz="1600" dirty="0" smtClean="0"/>
-              <a:t>document</a:t>
-            </a:r>
-          </a:p>
-          <a:p>
-            <a:endParaRPr lang="en-US" sz="1600" dirty="0"/>
-          </a:p>
-          <a:p>
-            <a:pPr marL="285750" indent="-285750">
-              <a:buFont typeface="Arial" pitchFamily="34" charset="0"/>
-              <a:buChar char="•"/>
-            </a:pPr>
-            <a:r>
-              <a:rPr lang="en-US" sz="1600" dirty="0" smtClean="0"/>
-              <a:t>timestamp: </a:t>
-            </a:r>
-            <a:r>
-              <a:rPr lang="en-US" sz="1600" dirty="0"/>
-              <a:t>when the message was transmitted by AWS </a:t>
-            </a:r>
-            <a:r>
-              <a:rPr lang="en-US" sz="1600" dirty="0" smtClean="0"/>
-              <a:t>IoT</a:t>
-            </a:r>
-          </a:p>
-          <a:p>
-            <a:endParaRPr lang="en-US" sz="1600" dirty="0"/>
-          </a:p>
-          <a:p>
-            <a:pPr marL="285750" indent="-285750">
-              <a:buFont typeface="Arial" pitchFamily="34" charset="0"/>
-              <a:buChar char="•"/>
-            </a:pPr>
-            <a:r>
-              <a:rPr lang="en-US" sz="1600" dirty="0" smtClean="0"/>
-              <a:t>version: </a:t>
-            </a:r>
-            <a:r>
-              <a:rPr lang="en-US" sz="1600" dirty="0"/>
+              <a:rPr lang="en-US" sz="1600" b="1" dirty="0" smtClean="0">
+                <a:solidFill>
+                  <a:prstClr val="black"/>
+                </a:solidFill>
+              </a:rPr>
+              <a:t>Version</a:t>
+            </a:r>
+            <a:r>
+              <a:rPr lang="en-US" sz="1600" dirty="0" smtClean="0">
+                <a:solidFill>
+                  <a:prstClr val="black"/>
+                </a:solidFill>
+              </a:rPr>
+              <a:t>: </a:t>
+            </a:r>
+            <a:r>
+              <a:rPr lang="en-US" sz="1600" dirty="0">
+                <a:solidFill>
+                  <a:prstClr val="black"/>
+                </a:solidFill>
+              </a:rPr>
               <a:t>Every time the document is updated, this version number is incremented</a:t>
             </a:r>
           </a:p>
@@ -6789,7 +6980,450 @@
     </p:spTree>
     <p:extLst>
       <p:ext uri="{BB962C8B-B14F-4D97-AF65-F5344CB8AC3E}">
-        <p14:creationId xmlns:p14="http://schemas.microsoft.com/office/powerpoint/2010/main" val="2582281366"/>
+        <p14:creationId xmlns:p14="http://schemas.microsoft.com/office/powerpoint/2010/main" val="886804435"/>
+      </p:ext>
+    </p:extLst>
+  </p:cSld>
+  <p:clrMapOvr>
+    <a:masterClrMapping/>
+  </p:clrMapOvr>
+  <p:timing>
+    <p:tnLst>
+      <p:par>
+        <p:cTn id="1" dur="indefinite" restart="never" nodeType="tmRoot"/>
+      </p:par>
+    </p:tnLst>
+  </p:timing>
+</p:sld>
+</file>
+
+<file path=ppt/slides/slide8.xml><?xml version="1.0" encoding="utf-8"?>
+<p:sld xmlns:a="http://schemas.openxmlformats.org/drawingml/2006/main" xmlns:r="http://schemas.openxmlformats.org/officeDocument/2006/relationships" xmlns:p="http://schemas.openxmlformats.org/presentationml/2006/main">
+  <p:cSld>
+    <p:spTree>
+      <p:nvGrpSpPr>
+        <p:cNvPr id="1" name=""/>
+        <p:cNvGrpSpPr/>
+        <p:nvPr/>
+      </p:nvGrpSpPr>
+      <p:grpSpPr>
+        <a:xfrm>
+          <a:off x="0" y="0"/>
+          <a:ext cx="0" cy="0"/>
+          <a:chOff x="0" y="0"/>
+          <a:chExt cx="0" cy="0"/>
+        </a:xfrm>
+      </p:grpSpPr>
+      <p:sp>
+        <p:nvSpPr>
+          <p:cNvPr id="2" name="Title 1"/>
+          <p:cNvSpPr>
+            <a:spLocks noGrp="1"/>
+          </p:cNvSpPr>
+          <p:nvPr>
+            <p:ph type="title"/>
+          </p:nvPr>
+        </p:nvSpPr>
+        <p:spPr/>
+        <p:txBody>
+          <a:bodyPr/>
+          <a:lstStyle/>
+          <a:p>
+            <a:r>
+              <a:rPr lang="en-US" dirty="0" smtClean="0"/>
+              <a:t>Device Shadow Document</a:t>
+            </a:r>
+            <a:endParaRPr lang="en-US" dirty="0"/>
+          </a:p>
+        </p:txBody>
+      </p:sp>
+      <p:pic>
+        <p:nvPicPr>
+          <p:cNvPr id="3" name="Picture 2" descr="KAL-Logo.png"/>
+          <p:cNvPicPr>
+            <a:picLocks noChangeAspect="1"/>
+          </p:cNvPicPr>
+          <p:nvPr/>
+        </p:nvPicPr>
+        <p:blipFill>
+          <a:blip r:embed="rId2" cstate="print"/>
+          <a:stretch>
+            <a:fillRect/>
+          </a:stretch>
+        </p:blipFill>
+        <p:spPr>
+          <a:xfrm>
+            <a:off x="7848600" y="152400"/>
+            <a:ext cx="1143160" cy="762106"/>
+          </a:xfrm>
+          <a:prstGeom prst="rect">
+            <a:avLst/>
+          </a:prstGeom>
+        </p:spPr>
+      </p:pic>
+      <p:sp>
+        <p:nvSpPr>
+          <p:cNvPr id="7" name="TextBox 6"/>
+          <p:cNvSpPr txBox="1"/>
+          <p:nvPr/>
+        </p:nvSpPr>
+        <p:spPr>
+          <a:xfrm>
+            <a:off x="1190096" y="1221582"/>
+            <a:ext cx="6607233" cy="5262979"/>
+          </a:xfrm>
+          <a:prstGeom prst="rect">
+            <a:avLst/>
+          </a:prstGeom>
+          <a:noFill/>
+        </p:spPr>
+        <p:txBody>
+          <a:bodyPr wrap="square" rtlCol="0">
+            <a:spAutoFit/>
+          </a:bodyPr>
+          <a:lstStyle/>
+          <a:p>
+            <a:r>
+              <a:rPr lang="en-US" sz="1400" dirty="0" smtClean="0"/>
+              <a:t>{</a:t>
+            </a:r>
+            <a:r>
+              <a:rPr lang="en-US" sz="1400" dirty="0"/>
+              <a:t/>
+            </a:r>
+            <a:br>
+              <a:rPr lang="en-US" sz="1400" dirty="0"/>
+            </a:br>
+            <a:r>
+              <a:rPr lang="en-US" sz="1400" dirty="0"/>
+              <a:t>  </a:t>
+            </a:r>
+            <a:r>
+              <a:rPr lang="en-US" sz="1400" b="1" dirty="0"/>
+              <a:t>"state"</a:t>
+            </a:r>
+            <a:r>
+              <a:rPr lang="en-US" sz="1400" dirty="0"/>
+              <a:t>: {</a:t>
+            </a:r>
+            <a:br>
+              <a:rPr lang="en-US" sz="1400" dirty="0"/>
+            </a:br>
+            <a:r>
+              <a:rPr lang="en-US" sz="1400" dirty="0"/>
+              <a:t>    </a:t>
+            </a:r>
+            <a:r>
+              <a:rPr lang="en-US" sz="1400" b="1" dirty="0"/>
+              <a:t>"</a:t>
+            </a:r>
+            <a:r>
+              <a:rPr lang="en-US" sz="1400" b="1" dirty="0">
+                <a:solidFill>
+                  <a:srgbClr val="00B050"/>
+                </a:solidFill>
+              </a:rPr>
+              <a:t>desired</a:t>
+            </a:r>
+            <a:r>
+              <a:rPr lang="en-US" sz="1400" b="1" dirty="0"/>
+              <a:t>"</a:t>
+            </a:r>
+            <a:r>
+              <a:rPr lang="en-US" sz="1400" dirty="0"/>
+              <a:t>: {</a:t>
+            </a:r>
+            <a:br>
+              <a:rPr lang="en-US" sz="1400" dirty="0"/>
+            </a:br>
+            <a:r>
+              <a:rPr lang="en-US" sz="1400" dirty="0"/>
+              <a:t>      </a:t>
+            </a:r>
+            <a:r>
+              <a:rPr lang="en-US" sz="1400" b="1" dirty="0"/>
+              <a:t>"roomTemperature"</a:t>
+            </a:r>
+            <a:r>
+              <a:rPr lang="en-US" sz="1400" dirty="0"/>
+              <a:t>: 60,</a:t>
+            </a:r>
+            <a:br>
+              <a:rPr lang="en-US" sz="1400" dirty="0"/>
+            </a:br>
+            <a:r>
+              <a:rPr lang="en-US" sz="1400" dirty="0"/>
+              <a:t>      </a:t>
+            </a:r>
+            <a:r>
+              <a:rPr lang="en-US" sz="1400" b="1" dirty="0"/>
+              <a:t>"windowOpen"</a:t>
+            </a:r>
+            <a:r>
+              <a:rPr lang="en-US" sz="1400" dirty="0"/>
+              <a:t>: </a:t>
+            </a:r>
+            <a:r>
+              <a:rPr lang="en-US" sz="1400" b="1" dirty="0"/>
+              <a:t>true</a:t>
+            </a:r>
+            <a:br>
+              <a:rPr lang="en-US" sz="1400" b="1" dirty="0"/>
+            </a:br>
+            <a:r>
+              <a:rPr lang="en-US" sz="1400" b="1" dirty="0"/>
+              <a:t>    </a:t>
+            </a:r>
+            <a:r>
+              <a:rPr lang="en-US" sz="1400" dirty="0"/>
+              <a:t>},</a:t>
+            </a:r>
+            <a:br>
+              <a:rPr lang="en-US" sz="1400" dirty="0"/>
+            </a:br>
+            <a:r>
+              <a:rPr lang="en-US" sz="1400" dirty="0"/>
+              <a:t>    </a:t>
+            </a:r>
+            <a:r>
+              <a:rPr lang="en-US" sz="1400" b="1" dirty="0"/>
+              <a:t>"</a:t>
+            </a:r>
+            <a:r>
+              <a:rPr lang="en-US" sz="1400" b="1" dirty="0">
+                <a:solidFill>
+                  <a:srgbClr val="FF0000"/>
+                </a:solidFill>
+              </a:rPr>
+              <a:t>reported</a:t>
+            </a:r>
+            <a:r>
+              <a:rPr lang="en-US" sz="1400" b="1" dirty="0"/>
+              <a:t>"</a:t>
+            </a:r>
+            <a:r>
+              <a:rPr lang="en-US" sz="1400" dirty="0"/>
+              <a:t>: {</a:t>
+            </a:r>
+            <a:br>
+              <a:rPr lang="en-US" sz="1400" dirty="0"/>
+            </a:br>
+            <a:r>
+              <a:rPr lang="en-US" sz="1400" dirty="0"/>
+              <a:t>      </a:t>
+            </a:r>
+            <a:r>
+              <a:rPr lang="en-US" sz="1400" b="1" dirty="0"/>
+              <a:t>"roomTemperature"</a:t>
+            </a:r>
+            <a:r>
+              <a:rPr lang="en-US" sz="1400" dirty="0"/>
+              <a:t>: 60,</a:t>
+            </a:r>
+            <a:br>
+              <a:rPr lang="en-US" sz="1400" dirty="0"/>
+            </a:br>
+            <a:r>
+              <a:rPr lang="en-US" sz="1400" dirty="0"/>
+              <a:t>      </a:t>
+            </a:r>
+            <a:r>
+              <a:rPr lang="en-US" sz="1400" b="1" dirty="0"/>
+              <a:t>"windowOpen"</a:t>
+            </a:r>
+            <a:r>
+              <a:rPr lang="en-US" sz="1400" dirty="0"/>
+              <a:t>: </a:t>
+            </a:r>
+            <a:r>
+              <a:rPr lang="en-US" sz="1400" b="1" dirty="0"/>
+              <a:t>true</a:t>
+            </a:r>
+            <a:br>
+              <a:rPr lang="en-US" sz="1400" b="1" dirty="0"/>
+            </a:br>
+            <a:r>
+              <a:rPr lang="en-US" sz="1400" b="1" dirty="0"/>
+              <a:t>    </a:t>
+            </a:r>
+            <a:r>
+              <a:rPr lang="en-US" sz="1400" dirty="0"/>
+              <a:t>}</a:t>
+            </a:r>
+            <a:br>
+              <a:rPr lang="en-US" sz="1400" dirty="0"/>
+            </a:br>
+            <a:r>
+              <a:rPr lang="en-US" sz="1400" dirty="0"/>
+              <a:t>  },</a:t>
+            </a:r>
+            <a:br>
+              <a:rPr lang="en-US" sz="1400" dirty="0"/>
+            </a:br>
+            <a:r>
+              <a:rPr lang="en-US" sz="1400" dirty="0"/>
+              <a:t>  </a:t>
+            </a:r>
+            <a:r>
+              <a:rPr lang="en-US" sz="1400" b="1" dirty="0"/>
+              <a:t>"metadata"</a:t>
+            </a:r>
+            <a:r>
+              <a:rPr lang="en-US" sz="1400" dirty="0"/>
+              <a:t>: {</a:t>
+            </a:r>
+            <a:br>
+              <a:rPr lang="en-US" sz="1400" dirty="0"/>
+            </a:br>
+            <a:r>
+              <a:rPr lang="en-US" sz="1400" dirty="0"/>
+              <a:t>    </a:t>
+            </a:r>
+            <a:r>
+              <a:rPr lang="en-US" sz="1400" b="1" dirty="0"/>
+              <a:t>"desired"</a:t>
+            </a:r>
+            <a:r>
+              <a:rPr lang="en-US" sz="1400" dirty="0"/>
+              <a:t>: {</a:t>
+            </a:r>
+            <a:br>
+              <a:rPr lang="en-US" sz="1400" dirty="0"/>
+            </a:br>
+            <a:r>
+              <a:rPr lang="en-US" sz="1400" dirty="0"/>
+              <a:t>      </a:t>
+            </a:r>
+            <a:r>
+              <a:rPr lang="en-US" sz="1400" b="1" dirty="0"/>
+              <a:t>"roomTemperature"</a:t>
+            </a:r>
+            <a:r>
+              <a:rPr lang="en-US" sz="1400" dirty="0"/>
+              <a:t>: {</a:t>
+            </a:r>
+            <a:br>
+              <a:rPr lang="en-US" sz="1400" dirty="0"/>
+            </a:br>
+            <a:r>
+              <a:rPr lang="en-US" sz="1400" dirty="0"/>
+              <a:t>        </a:t>
+            </a:r>
+            <a:r>
+              <a:rPr lang="en-US" sz="1400" b="1" dirty="0"/>
+              <a:t>"timestamp"</a:t>
+            </a:r>
+            <a:r>
+              <a:rPr lang="en-US" sz="1400" dirty="0"/>
+              <a:t>: 1493129996</a:t>
+            </a:r>
+            <a:br>
+              <a:rPr lang="en-US" sz="1400" dirty="0"/>
+            </a:br>
+            <a:r>
+              <a:rPr lang="en-US" sz="1400" dirty="0"/>
+              <a:t>      },</a:t>
+            </a:r>
+            <a:br>
+              <a:rPr lang="en-US" sz="1400" dirty="0"/>
+            </a:br>
+            <a:r>
+              <a:rPr lang="en-US" sz="1400" dirty="0"/>
+              <a:t>      </a:t>
+            </a:r>
+            <a:r>
+              <a:rPr lang="en-US" sz="1400" b="1" dirty="0"/>
+              <a:t>"windowOpen"</a:t>
+            </a:r>
+            <a:r>
+              <a:rPr lang="en-US" sz="1400" dirty="0"/>
+              <a:t>: {</a:t>
+            </a:r>
+            <a:br>
+              <a:rPr lang="en-US" sz="1400" dirty="0"/>
+            </a:br>
+            <a:r>
+              <a:rPr lang="en-US" sz="1400" dirty="0"/>
+              <a:t>        </a:t>
+            </a:r>
+            <a:r>
+              <a:rPr lang="en-US" sz="1400" b="1" dirty="0"/>
+              <a:t>"timestamp"</a:t>
+            </a:r>
+            <a:r>
+              <a:rPr lang="en-US" sz="1400" dirty="0"/>
+              <a:t>: 1493129553</a:t>
+            </a:r>
+            <a:br>
+              <a:rPr lang="en-US" sz="1400" dirty="0"/>
+            </a:br>
+            <a:r>
+              <a:rPr lang="en-US" sz="1400" dirty="0"/>
+              <a:t>      }</a:t>
+            </a:r>
+            <a:br>
+              <a:rPr lang="en-US" sz="1400" dirty="0"/>
+            </a:br>
+            <a:r>
+              <a:rPr lang="en-US" sz="1400" dirty="0"/>
+              <a:t>    }</a:t>
+            </a:r>
+            <a:br>
+              <a:rPr lang="en-US" sz="1400" dirty="0"/>
+            </a:br>
+            <a:r>
+              <a:rPr lang="en-US" sz="1400" dirty="0"/>
+              <a:t>  },</a:t>
+            </a:r>
+            <a:br>
+              <a:rPr lang="en-US" sz="1400" dirty="0"/>
+            </a:br>
+            <a:r>
+              <a:rPr lang="en-US" sz="1400" dirty="0"/>
+              <a:t>  </a:t>
+            </a:r>
+            <a:r>
+              <a:rPr lang="en-US" sz="1400" b="1" dirty="0"/>
+              <a:t>"version"</a:t>
+            </a:r>
+            <a:r>
+              <a:rPr lang="en-US" sz="1400" dirty="0"/>
+              <a:t>: 15,</a:t>
+            </a:r>
+            <a:br>
+              <a:rPr lang="en-US" sz="1400" dirty="0"/>
+            </a:br>
+            <a:r>
+              <a:rPr lang="en-US" sz="1400" dirty="0"/>
+              <a:t>  </a:t>
+            </a:r>
+            <a:r>
+              <a:rPr lang="en-US" sz="1400" b="1" dirty="0"/>
+              <a:t>"timestamp"</a:t>
+            </a:r>
+            <a:r>
+              <a:rPr lang="en-US" sz="1400" dirty="0"/>
+              <a:t>: 1493130057</a:t>
+            </a:r>
+            <a:br>
+              <a:rPr lang="en-US" sz="1400" dirty="0"/>
+            </a:br>
+            <a:r>
+              <a:rPr lang="en-US" sz="1400" dirty="0"/>
+              <a:t>}</a:t>
+            </a:r>
+            <a:endParaRPr lang="en-US" sz="1400" dirty="0">
+              <a:solidFill>
+                <a:prstClr val="black"/>
+              </a:solidFill>
+            </a:endParaRPr>
+          </a:p>
+        </p:txBody>
+      </p:sp>
+    </p:spTree>
+    <p:extLst>
+      <p:ext uri="{BB962C8B-B14F-4D97-AF65-F5344CB8AC3E}">
+        <p14:creationId xmlns:p14="http://schemas.microsoft.com/office/powerpoint/2010/main" val="2395034650"/>
       </p:ext>
     </p:extLst>
   </p:cSld>
@@ -6833,16 +7467,26 @@
             <p:ph type="title"/>
           </p:nvPr>
         </p:nvSpPr>
-        <p:spPr/>
-        <p:txBody>
-          <a:bodyPr/>
+        <p:spPr>
+          <a:xfrm>
+            <a:off x="238716" y="274638"/>
+            <a:ext cx="8229600" cy="1143000"/>
+          </a:xfrm>
+        </p:spPr>
+        <p:txBody>
+          <a:bodyPr>
+            <a:normAutofit/>
+          </a:bodyPr>
           <a:lstStyle/>
           <a:p>
             <a:r>
               <a:rPr lang="en-US" dirty="0" smtClean="0"/>
-              <a:t>Device Shadow Document</a:t>
-            </a:r>
-            <a:endParaRPr lang="en-US" dirty="0"/>
+              <a:t>Device </a:t>
+            </a:r>
+            <a:r>
+              <a:rPr lang="en-US" dirty="0"/>
+              <a:t>Shadows Data Flow</a:t>
+            </a:r>
           </a:p>
         </p:txBody>
       </p:sp>
@@ -6872,14 +7516,14 @@
       </p:pic>
       <p:sp>
         <p:nvSpPr>
-          <p:cNvPr id="7" name="TextBox 6"/>
+          <p:cNvPr id="5" name="TextBox 4"/>
           <p:cNvSpPr txBox="1"/>
           <p:nvPr/>
         </p:nvSpPr>
         <p:spPr>
           <a:xfrm>
-            <a:off x="1190096" y="1379529"/>
-            <a:ext cx="6607233" cy="4524315"/>
+            <a:off x="426399" y="1364050"/>
+            <a:ext cx="7514877" cy="1200329"/>
           </a:xfrm>
           <a:prstGeom prst="rect">
             <a:avLst/>
@@ -6892,323 +7536,162 @@
           </a:bodyPr>
           <a:lstStyle/>
           <a:p>
-            <a:r>
-              <a:rPr lang="en-US" sz="1200" dirty="0" smtClean="0"/>
-              <a:t>{</a:t>
-            </a:r>
-            <a:r>
-              <a:rPr lang="en-US" sz="1200" dirty="0"/>
-              <a:t/>
-            </a:r>
-            <a:br>
-              <a:rPr lang="en-US" sz="1200" dirty="0"/>
-            </a:br>
-            <a:r>
-              <a:rPr lang="en-US" sz="1200" dirty="0"/>
-              <a:t>  </a:t>
-            </a:r>
-            <a:r>
-              <a:rPr lang="en-US" sz="1200" b="1" dirty="0"/>
-              <a:t>"state"</a:t>
-            </a:r>
-            <a:r>
-              <a:rPr lang="en-US" sz="1200" dirty="0"/>
-              <a:t>: {</a:t>
-            </a:r>
-            <a:br>
-              <a:rPr lang="en-US" sz="1200" dirty="0"/>
-            </a:br>
-            <a:r>
-              <a:rPr lang="en-US" sz="1200" dirty="0"/>
-              <a:t>    </a:t>
-            </a:r>
-            <a:r>
-              <a:rPr lang="en-US" sz="1200" b="1" dirty="0"/>
-              <a:t>"desired"</a:t>
-            </a:r>
-            <a:r>
-              <a:rPr lang="en-US" sz="1200" dirty="0"/>
-              <a:t>: {</a:t>
-            </a:r>
-            <a:br>
-              <a:rPr lang="en-US" sz="1200" dirty="0"/>
-            </a:br>
-            <a:r>
-              <a:rPr lang="en-US" sz="1200" dirty="0"/>
-              <a:t>      </a:t>
-            </a:r>
-            <a:r>
-              <a:rPr lang="en-US" sz="1200" b="1" dirty="0"/>
-              <a:t>"roomTemperature"</a:t>
-            </a:r>
-            <a:r>
-              <a:rPr lang="en-US" sz="1200" dirty="0"/>
-              <a:t>: 60,</a:t>
-            </a:r>
-            <a:br>
-              <a:rPr lang="en-US" sz="1200" dirty="0"/>
-            </a:br>
-            <a:r>
-              <a:rPr lang="en-US" sz="1200" dirty="0"/>
-              <a:t>      </a:t>
-            </a:r>
-            <a:r>
-              <a:rPr lang="en-US" sz="1200" b="1" dirty="0"/>
-              <a:t>"windowOpen"</a:t>
-            </a:r>
-            <a:r>
-              <a:rPr lang="en-US" sz="1200" dirty="0"/>
-              <a:t>: </a:t>
-            </a:r>
-            <a:r>
-              <a:rPr lang="en-US" sz="1200" b="1" dirty="0"/>
-              <a:t>true</a:t>
-            </a:r>
-            <a:br>
-              <a:rPr lang="en-US" sz="1200" b="1" dirty="0"/>
-            </a:br>
-            <a:r>
-              <a:rPr lang="en-US" sz="1200" b="1" dirty="0"/>
-              <a:t>    </a:t>
-            </a:r>
-            <a:r>
-              <a:rPr lang="en-US" sz="1200" dirty="0"/>
-              <a:t>},</a:t>
-            </a:r>
-            <a:br>
-              <a:rPr lang="en-US" sz="1200" dirty="0"/>
-            </a:br>
-            <a:r>
-              <a:rPr lang="en-US" sz="1200" dirty="0"/>
-              <a:t>    </a:t>
-            </a:r>
-            <a:r>
-              <a:rPr lang="en-US" sz="1200" b="1" dirty="0"/>
-              <a:t>"reported"</a:t>
-            </a:r>
-            <a:r>
-              <a:rPr lang="en-US" sz="1200" dirty="0"/>
-              <a:t>: {</a:t>
-            </a:r>
-            <a:br>
-              <a:rPr lang="en-US" sz="1200" dirty="0"/>
-            </a:br>
-            <a:r>
-              <a:rPr lang="en-US" sz="1200" dirty="0"/>
-              <a:t>      </a:t>
-            </a:r>
-            <a:r>
-              <a:rPr lang="en-US" sz="1200" b="1" dirty="0"/>
-              <a:t>"roomTemperature"</a:t>
-            </a:r>
-            <a:r>
-              <a:rPr lang="en-US" sz="1200" dirty="0"/>
-              <a:t>: 60,</a:t>
-            </a:r>
-            <a:br>
-              <a:rPr lang="en-US" sz="1200" dirty="0"/>
-            </a:br>
-            <a:r>
-              <a:rPr lang="en-US" sz="1200" dirty="0"/>
-              <a:t>      </a:t>
-            </a:r>
-            <a:r>
-              <a:rPr lang="en-US" sz="1200" b="1" dirty="0"/>
-              <a:t>"windowOpen"</a:t>
-            </a:r>
-            <a:r>
-              <a:rPr lang="en-US" sz="1200" dirty="0"/>
-              <a:t>: </a:t>
-            </a:r>
-            <a:r>
-              <a:rPr lang="en-US" sz="1200" b="1" dirty="0"/>
-              <a:t>true</a:t>
-            </a:r>
-            <a:br>
-              <a:rPr lang="en-US" sz="1200" b="1" dirty="0"/>
-            </a:br>
-            <a:r>
-              <a:rPr lang="en-US" sz="1200" b="1" dirty="0"/>
-              <a:t>    </a:t>
-            </a:r>
-            <a:r>
-              <a:rPr lang="en-US" sz="1200" dirty="0"/>
-              <a:t>}</a:t>
-            </a:r>
-            <a:br>
-              <a:rPr lang="en-US" sz="1200" dirty="0"/>
-            </a:br>
-            <a:r>
-              <a:rPr lang="en-US" sz="1200" dirty="0"/>
-              <a:t>  },</a:t>
-            </a:r>
-            <a:br>
-              <a:rPr lang="en-US" sz="1200" dirty="0"/>
-            </a:br>
-            <a:r>
-              <a:rPr lang="en-US" sz="1200" dirty="0"/>
-              <a:t>  </a:t>
-            </a:r>
-            <a:r>
-              <a:rPr lang="en-US" sz="1200" b="1" dirty="0"/>
-              <a:t>"metadata"</a:t>
-            </a:r>
-            <a:r>
-              <a:rPr lang="en-US" sz="1200" dirty="0"/>
-              <a:t>: {</a:t>
-            </a:r>
-            <a:br>
-              <a:rPr lang="en-US" sz="1200" dirty="0"/>
-            </a:br>
-            <a:r>
-              <a:rPr lang="en-US" sz="1200" dirty="0"/>
-              <a:t>    </a:t>
-            </a:r>
-            <a:r>
-              <a:rPr lang="en-US" sz="1200" b="1" dirty="0"/>
-              <a:t>"desired"</a:t>
-            </a:r>
-            <a:r>
-              <a:rPr lang="en-US" sz="1200" dirty="0"/>
-              <a:t>: {</a:t>
-            </a:r>
-            <a:br>
-              <a:rPr lang="en-US" sz="1200" dirty="0"/>
-            </a:br>
-            <a:r>
-              <a:rPr lang="en-US" sz="1200" dirty="0"/>
-              <a:t>      </a:t>
-            </a:r>
-            <a:r>
-              <a:rPr lang="en-US" sz="1200" b="1" dirty="0"/>
-              <a:t>"roomTemperature"</a:t>
-            </a:r>
-            <a:r>
-              <a:rPr lang="en-US" sz="1200" dirty="0"/>
-              <a:t>: {</a:t>
-            </a:r>
-            <a:br>
-              <a:rPr lang="en-US" sz="1200" dirty="0"/>
-            </a:br>
-            <a:r>
-              <a:rPr lang="en-US" sz="1200" dirty="0"/>
-              <a:t>        </a:t>
-            </a:r>
-            <a:r>
-              <a:rPr lang="en-US" sz="1200" b="1" dirty="0"/>
-              <a:t>"timestamp"</a:t>
-            </a:r>
-            <a:r>
-              <a:rPr lang="en-US" sz="1200" dirty="0"/>
-              <a:t>: 1493129996</a:t>
-            </a:r>
-            <a:br>
-              <a:rPr lang="en-US" sz="1200" dirty="0"/>
-            </a:br>
-            <a:r>
-              <a:rPr lang="en-US" sz="1200" dirty="0"/>
-              <a:t>      },</a:t>
-            </a:r>
-            <a:br>
-              <a:rPr lang="en-US" sz="1200" dirty="0"/>
-            </a:br>
-            <a:r>
-              <a:rPr lang="en-US" sz="1200" dirty="0"/>
-              <a:t>      </a:t>
-            </a:r>
-            <a:r>
-              <a:rPr lang="en-US" sz="1200" b="1" dirty="0"/>
-              <a:t>"windowOpen"</a:t>
-            </a:r>
-            <a:r>
-              <a:rPr lang="en-US" sz="1200" dirty="0"/>
-              <a:t>: {</a:t>
-            </a:r>
-            <a:br>
-              <a:rPr lang="en-US" sz="1200" dirty="0"/>
-            </a:br>
-            <a:r>
-              <a:rPr lang="en-US" sz="1200" dirty="0"/>
-              <a:t>        </a:t>
-            </a:r>
-            <a:r>
-              <a:rPr lang="en-US" sz="1200" b="1" dirty="0"/>
-              <a:t>"timestamp"</a:t>
-            </a:r>
-            <a:r>
-              <a:rPr lang="en-US" sz="1200" dirty="0"/>
-              <a:t>: 1493129553</a:t>
-            </a:r>
-            <a:br>
-              <a:rPr lang="en-US" sz="1200" dirty="0"/>
-            </a:br>
-            <a:r>
-              <a:rPr lang="en-US" sz="1200" dirty="0"/>
-              <a:t>      }</a:t>
-            </a:r>
-            <a:br>
-              <a:rPr lang="en-US" sz="1200" dirty="0"/>
-            </a:br>
-            <a:r>
-              <a:rPr lang="en-US" sz="1200" dirty="0"/>
-              <a:t>    }</a:t>
-            </a:r>
-            <a:br>
-              <a:rPr lang="en-US" sz="1200" dirty="0"/>
-            </a:br>
-            <a:r>
-              <a:rPr lang="en-US" sz="1200" dirty="0"/>
-              <a:t>  },</a:t>
-            </a:r>
-            <a:br>
-              <a:rPr lang="en-US" sz="1200" dirty="0"/>
-            </a:br>
-            <a:r>
-              <a:rPr lang="en-US" sz="1200" dirty="0"/>
-              <a:t>  </a:t>
-            </a:r>
-            <a:r>
-              <a:rPr lang="en-US" sz="1200" b="1" dirty="0"/>
-              <a:t>"version"</a:t>
-            </a:r>
-            <a:r>
-              <a:rPr lang="en-US" sz="1200" dirty="0"/>
-              <a:t>: 15,</a:t>
-            </a:r>
-            <a:br>
-              <a:rPr lang="en-US" sz="1200" dirty="0"/>
-            </a:br>
-            <a:r>
-              <a:rPr lang="en-US" sz="1200" dirty="0"/>
-              <a:t>  </a:t>
-            </a:r>
-            <a:r>
-              <a:rPr lang="en-US" sz="1200" b="1" dirty="0"/>
-              <a:t>"timestamp"</a:t>
-            </a:r>
-            <a:r>
-              <a:rPr lang="en-US" sz="1200" dirty="0"/>
-              <a:t>: 1493130057</a:t>
-            </a:r>
-            <a:br>
-              <a:rPr lang="en-US" sz="1200" dirty="0"/>
-            </a:br>
-            <a:r>
-              <a:rPr lang="en-US" sz="1200" dirty="0"/>
-              <a:t>}</a:t>
-            </a:r>
-            <a:endParaRPr lang="en-US" sz="1200" dirty="0">
-              <a:solidFill>
-                <a:prstClr val="black"/>
-              </a:solidFill>
-            </a:endParaRPr>
+            <a:pPr marL="285750" indent="-285750">
+              <a:buFont typeface="Arial" pitchFamily="34" charset="0"/>
+              <a:buChar char="•"/>
+            </a:pPr>
+            <a:r>
+              <a:rPr lang="en-US" dirty="0"/>
+              <a:t>The </a:t>
+            </a:r>
+            <a:r>
+              <a:rPr lang="en-US" b="1" dirty="0"/>
+              <a:t>Thing Shadows services</a:t>
+            </a:r>
+            <a:r>
+              <a:rPr lang="en-US" dirty="0"/>
+              <a:t> acts as an intermediary, allowing devices and applications to retrieve and update thing shadows</a:t>
+            </a:r>
+            <a:r>
+              <a:rPr lang="en-US" dirty="0" smtClean="0"/>
+              <a:t>.</a:t>
+            </a:r>
+          </a:p>
+          <a:p>
+            <a:pPr marL="285750" indent="-285750">
+              <a:buFont typeface="Arial" pitchFamily="34" charset="0"/>
+              <a:buChar char="•"/>
+            </a:pPr>
+            <a:r>
+              <a:rPr lang="en-US" dirty="0"/>
+              <a:t>The </a:t>
+            </a:r>
+            <a:r>
+              <a:rPr lang="en-US" b="1" dirty="0"/>
+              <a:t>Thing Shadows service </a:t>
+            </a:r>
+            <a:r>
+              <a:rPr lang="en-US" dirty="0"/>
+              <a:t>uses MQTT topics to facilitate communication between applications and devices. </a:t>
+            </a:r>
+          </a:p>
+        </p:txBody>
+      </p:sp>
+      <p:sp>
+        <p:nvSpPr>
+          <p:cNvPr id="6" name="TextBox 5"/>
+          <p:cNvSpPr txBox="1"/>
+          <p:nvPr/>
+        </p:nvSpPr>
+        <p:spPr>
+          <a:xfrm>
+            <a:off x="695916" y="2670375"/>
+            <a:ext cx="7249788" cy="3139321"/>
+          </a:xfrm>
+          <a:prstGeom prst="rect">
+            <a:avLst/>
+          </a:prstGeom>
+          <a:noFill/>
+        </p:spPr>
+        <p:txBody>
+          <a:bodyPr wrap="square" rtlCol="0">
+            <a:spAutoFit/>
+          </a:bodyPr>
+          <a:lstStyle/>
+          <a:p>
+            <a:r>
+              <a:rPr lang="en-US" dirty="0" smtClean="0"/>
+              <a:t>Example MQTT topics:</a:t>
+            </a:r>
+          </a:p>
+          <a:p>
+            <a:endParaRPr lang="en-US" dirty="0" smtClean="0"/>
+          </a:p>
+          <a:p>
+            <a:r>
+              <a:rPr lang="en-US" dirty="0"/>
+              <a:t>$</a:t>
+            </a:r>
+            <a:r>
+              <a:rPr lang="en-US" dirty="0" smtClean="0"/>
+              <a:t>aws/things/&lt;myiotdevice&gt;/</a:t>
+            </a:r>
+            <a:r>
+              <a:rPr lang="en-US" dirty="0" smtClean="0"/>
+              <a:t>shadow/update</a:t>
+            </a:r>
+            <a:endParaRPr lang="en-US" dirty="0" smtClean="0"/>
+          </a:p>
+          <a:p>
+            <a:endParaRPr lang="en-US" dirty="0" smtClean="0"/>
+          </a:p>
+          <a:p>
+            <a:pPr lvl="1"/>
+            <a:r>
+              <a:rPr lang="en-US" dirty="0"/>
+              <a:t>You can update a thing shadow by </a:t>
+            </a:r>
+            <a:r>
+              <a:rPr lang="en-US" dirty="0" smtClean="0"/>
+              <a:t>publishing </a:t>
+            </a:r>
+            <a:r>
+              <a:rPr lang="en-US" dirty="0"/>
+              <a:t>to the /update </a:t>
+            </a:r>
+            <a:r>
+              <a:rPr lang="en-US" dirty="0" smtClean="0"/>
+              <a:t>topic.</a:t>
+            </a:r>
+          </a:p>
+          <a:p>
+            <a:pPr lvl="1"/>
+            <a:endParaRPr lang="en-US" dirty="0"/>
+          </a:p>
+          <a:p>
+            <a:r>
+              <a:rPr lang="en-US" dirty="0" smtClean="0"/>
+              <a:t>$</a:t>
+            </a:r>
+            <a:r>
+              <a:rPr lang="en-US" dirty="0" smtClean="0"/>
+              <a:t>aws/things/&lt;</a:t>
+            </a:r>
+            <a:r>
+              <a:rPr lang="en-US" dirty="0"/>
+              <a:t>myiotdevice&gt;/ </a:t>
+            </a:r>
+            <a:r>
+              <a:rPr lang="en-US" dirty="0" smtClean="0"/>
+              <a:t>shadow/update/get</a:t>
+            </a:r>
+            <a:endParaRPr lang="en-US" dirty="0" smtClean="0"/>
+          </a:p>
+          <a:p>
+            <a:endParaRPr lang="en-US" dirty="0" smtClean="0"/>
+          </a:p>
+          <a:p>
+            <a:pPr lvl="1"/>
+            <a:r>
+              <a:rPr lang="en-US" dirty="0"/>
+              <a:t>You can retrieve a thing shadow by </a:t>
+            </a:r>
+            <a:r>
+              <a:rPr lang="en-US" dirty="0" smtClean="0"/>
+              <a:t>subscribing to </a:t>
+            </a:r>
+            <a:r>
+              <a:rPr lang="en-US" dirty="0"/>
+              <a:t>the /get topic. This retrieves the entire document plus the delta between the desired or reported states.</a:t>
+            </a:r>
+            <a:endParaRPr lang="en-US" dirty="0"/>
           </a:p>
         </p:txBody>
       </p:sp>
     </p:spTree>
     <p:extLst>
       <p:ext uri="{BB962C8B-B14F-4D97-AF65-F5344CB8AC3E}">
-        <p14:creationId xmlns:p14="http://schemas.microsoft.com/office/powerpoint/2010/main" val="2395034650"/>
+        <p14:creationId xmlns:p14="http://schemas.microsoft.com/office/powerpoint/2010/main" val="2582281366"/>
       </p:ext>
     </p:extLst>
   </p:cSld>

</xml_diff>